<commit_message>
week 22 and 23 in-class activities
</commit_message>
<xml_diff>
--- a/course_material/week_21/week_21_presentation.pptx
+++ b/course_material/week_21/week_21_presentation.pptx
@@ -5,7 +5,7 @@
     <p:sldMasterId id="2147483696" r:id="rId1"/>
   </p:sldMasterIdLst>
   <p:notesMasterIdLst>
-    <p:notesMasterId r:id="rId11"/>
+    <p:notesMasterId r:id="rId12"/>
   </p:notesMasterIdLst>
   <p:sldIdLst>
     <p:sldId id="256" r:id="rId2"/>
@@ -15,8 +15,9 @@
     <p:sldId id="323" r:id="rId6"/>
     <p:sldId id="322" r:id="rId7"/>
     <p:sldId id="324" r:id="rId8"/>
-    <p:sldId id="311" r:id="rId9"/>
-    <p:sldId id="271" r:id="rId10"/>
+    <p:sldId id="325" r:id="rId9"/>
+    <p:sldId id="311" r:id="rId10"/>
+    <p:sldId id="271" r:id="rId11"/>
   </p:sldIdLst>
   <p:sldSz cx="12192000" cy="6858000"/>
   <p:notesSz cx="6858000" cy="9144000"/>
@@ -1831,7 +1832,7 @@
           <a:p>
             <a:fld id="{5CF9EFDB-215C-4120-ADCB-EAD745B7163E}" type="datetimeFigureOut">
               <a:rPr lang="en-US" smtClean="0"/>
-              <a:t>7/13/2021</a:t>
+              <a:t>7/16/2021</a:t>
             </a:fld>
             <a:endParaRPr lang="en-US"/>
           </a:p>
@@ -2586,7 +2587,91 @@
           <a:p>
             <a:fld id="{791F1524-C5FD-4370-8A10-5BE52A97A495}" type="slidenum">
               <a:rPr lang="en-US" smtClean="0"/>
-              <a:t>9</a:t>
+              <a:t>8</a:t>
+            </a:fld>
+            <a:endParaRPr lang="en-US"/>
+          </a:p>
+        </p:txBody>
+      </p:sp>
+    </p:spTree>
+    <p:extLst>
+      <p:ext uri="{BB962C8B-B14F-4D97-AF65-F5344CB8AC3E}">
+        <p14:creationId xmlns:p14="http://schemas.microsoft.com/office/powerpoint/2010/main" val="662798630"/>
+      </p:ext>
+    </p:extLst>
+  </p:cSld>
+  <p:clrMapOvr>
+    <a:masterClrMapping/>
+  </p:clrMapOvr>
+</p:notes>
+</file>
+
+<file path=ppt/notesSlides/notesSlide7.xml><?xml version="1.0" encoding="utf-8"?>
+<p:notes xmlns:a="http://schemas.openxmlformats.org/drawingml/2006/main" xmlns:r="http://schemas.openxmlformats.org/officeDocument/2006/relationships" xmlns:p="http://schemas.openxmlformats.org/presentationml/2006/main">
+  <p:cSld>
+    <p:spTree>
+      <p:nvGrpSpPr>
+        <p:cNvPr id="1" name=""/>
+        <p:cNvGrpSpPr/>
+        <p:nvPr/>
+      </p:nvGrpSpPr>
+      <p:grpSpPr>
+        <a:xfrm>
+          <a:off x="0" y="0"/>
+          <a:ext cx="0" cy="0"/>
+          <a:chOff x="0" y="0"/>
+          <a:chExt cx="0" cy="0"/>
+        </a:xfrm>
+      </p:grpSpPr>
+      <p:sp>
+        <p:nvSpPr>
+          <p:cNvPr id="2" name="Slide Image Placeholder 1"/>
+          <p:cNvSpPr>
+            <a:spLocks noGrp="1" noRot="1" noChangeAspect="1"/>
+          </p:cNvSpPr>
+          <p:nvPr>
+            <p:ph type="sldImg"/>
+          </p:nvPr>
+        </p:nvSpPr>
+        <p:spPr/>
+      </p:sp>
+      <p:sp>
+        <p:nvSpPr>
+          <p:cNvPr id="3" name="Notes Placeholder 2"/>
+          <p:cNvSpPr>
+            <a:spLocks noGrp="1"/>
+          </p:cNvSpPr>
+          <p:nvPr>
+            <p:ph type="body" idx="1"/>
+          </p:nvPr>
+        </p:nvSpPr>
+        <p:spPr/>
+        <p:txBody>
+          <a:bodyPr/>
+          <a:lstStyle/>
+          <a:p>
+            <a:endParaRPr lang="en-US" dirty="0"/>
+          </a:p>
+        </p:txBody>
+      </p:sp>
+      <p:sp>
+        <p:nvSpPr>
+          <p:cNvPr id="4" name="Slide Number Placeholder 3"/>
+          <p:cNvSpPr>
+            <a:spLocks noGrp="1"/>
+          </p:cNvSpPr>
+          <p:nvPr>
+            <p:ph type="sldNum" sz="quarter" idx="5"/>
+          </p:nvPr>
+        </p:nvSpPr>
+        <p:spPr/>
+        <p:txBody>
+          <a:bodyPr/>
+          <a:lstStyle/>
+          <a:p>
+            <a:fld id="{791F1524-C5FD-4370-8A10-5BE52A97A495}" type="slidenum">
+              <a:rPr lang="en-US" smtClean="0"/>
+              <a:t>10</a:t>
             </a:fld>
             <a:endParaRPr lang="en-US"/>
           </a:p>
@@ -2799,7 +2884,7 @@
           <a:p>
             <a:fld id="{ACF1A1B0-862D-4909-A7DB-D8ADA062DFCA}" type="datetimeFigureOut">
               <a:rPr lang="en-US" dirty="0"/>
-              <a:t>7/13/2021</a:t>
+              <a:t>7/16/2021</a:t>
             </a:fld>
             <a:endParaRPr lang="en-US"/>
           </a:p>
@@ -3022,7 +3107,7 @@
           <a:p>
             <a:fld id="{7B156144-9CB7-4E3A-B87E-A382F9BE05EF}" type="datetimeFigureOut">
               <a:rPr lang="en-US" dirty="0"/>
-              <a:t>7/13/2021</a:t>
+              <a:t>7/16/2021</a:t>
             </a:fld>
             <a:endParaRPr lang="en-US"/>
           </a:p>
@@ -3200,7 +3285,7 @@
           <a:p>
             <a:fld id="{2643D55F-46AB-4791-9172-4FA8DD3A6A9C}" type="datetimeFigureOut">
               <a:rPr lang="en-US" dirty="0"/>
-              <a:t>7/13/2021</a:t>
+              <a:t>7/16/2021</a:t>
             </a:fld>
             <a:endParaRPr lang="en-US"/>
           </a:p>
@@ -3368,7 +3453,7 @@
           <a:p>
             <a:fld id="{58026881-8A08-449C-8D73-E5F201F814C1}" type="datetimeFigureOut">
               <a:rPr lang="en-US" dirty="0"/>
-              <a:t>7/13/2021</a:t>
+              <a:t>7/16/2021</a:t>
             </a:fld>
             <a:endParaRPr lang="en-US"/>
           </a:p>
@@ -3658,7 +3743,7 @@
           <a:p>
             <a:fld id="{1BEB5A5E-0C07-4E93-A112-D37B4D166B30}" type="datetimeFigureOut">
               <a:rPr lang="en-US" dirty="0"/>
-              <a:t>7/13/2021</a:t>
+              <a:t>7/16/2021</a:t>
             </a:fld>
             <a:endParaRPr lang="en-US"/>
           </a:p>
@@ -3981,7 +4066,7 @@
           <a:p>
             <a:fld id="{9E1F71C5-DC57-4358-A1EA-30C08AF6E3C5}" type="datetimeFigureOut">
               <a:rPr lang="en-US" dirty="0"/>
-              <a:t>7/13/2021</a:t>
+              <a:t>7/16/2021</a:t>
             </a:fld>
             <a:endParaRPr lang="en-US"/>
           </a:p>
@@ -4390,7 +4475,7 @@
           <a:p>
             <a:fld id="{12571DBA-DE60-4731-B773-47AAA185C143}" type="datetimeFigureOut">
               <a:rPr lang="en-US" dirty="0"/>
-              <a:t>7/13/2021</a:t>
+              <a:t>7/16/2021</a:t>
             </a:fld>
             <a:endParaRPr lang="en-US"/>
           </a:p>
@@ -4507,7 +4592,7 @@
           <a:p>
             <a:fld id="{4F170639-886C-4FCF-9EAB-ABB5DA3F3F4A}" type="datetimeFigureOut">
               <a:rPr lang="en-US" dirty="0"/>
-              <a:t>7/13/2021</a:t>
+              <a:t>7/16/2021</a:t>
             </a:fld>
             <a:endParaRPr lang="en-US"/>
           </a:p>
@@ -4602,7 +4687,7 @@
           <a:p>
             <a:fld id="{34C4A628-C83B-4C66-83F4-1711CE3738FD}" type="datetimeFigureOut">
               <a:rPr lang="en-US" dirty="0"/>
-              <a:t>7/13/2021</a:t>
+              <a:t>7/16/2021</a:t>
             </a:fld>
             <a:endParaRPr lang="en-US"/>
           </a:p>
@@ -4887,7 +4972,7 @@
           <a:p>
             <a:fld id="{B88C1D73-9400-43CA-A37F-F9B7D00DE14C}" type="datetimeFigureOut">
               <a:rPr lang="en-US" dirty="0"/>
-              <a:t>7/13/2021</a:t>
+              <a:t>7/16/2021</a:t>
             </a:fld>
             <a:endParaRPr lang="en-US"/>
           </a:p>
@@ -5159,7 +5244,7 @@
           <a:p>
             <a:fld id="{188B7711-B905-4633-B4D7-6F3A49A2E7D9}" type="datetimeFigureOut">
               <a:rPr lang="en-US" dirty="0"/>
-              <a:t>7/13/2021</a:t>
+              <a:t>7/16/2021</a:t>
             </a:fld>
             <a:endParaRPr lang="en-US"/>
           </a:p>
@@ -5409,7 +5494,7 @@
             <a:fld id="{89C235CF-BDA2-4E7E-8BBD-350479985E74}" type="datetimeFigureOut">
               <a:rPr lang="en-US" dirty="0"/>
               <a:pPr/>
-              <a:t>7/13/2021</a:t>
+              <a:t>7/16/2021</a:t>
             </a:fld>
             <a:endParaRPr lang="en-US"/>
           </a:p>
@@ -5953,6 +6038,106 @@
 </p:sld>
 </file>
 
+<file path=ppt/slides/slide10.xml><?xml version="1.0" encoding="utf-8"?>
+<p:sld xmlns:a="http://schemas.openxmlformats.org/drawingml/2006/main" xmlns:r="http://schemas.openxmlformats.org/officeDocument/2006/relationships" xmlns:p="http://schemas.openxmlformats.org/presentationml/2006/main">
+  <p:cSld>
+    <p:spTree>
+      <p:nvGrpSpPr>
+        <p:cNvPr id="1" name=""/>
+        <p:cNvGrpSpPr/>
+        <p:nvPr/>
+      </p:nvGrpSpPr>
+      <p:grpSpPr>
+        <a:xfrm>
+          <a:off x="0" y="0"/>
+          <a:ext cx="0" cy="0"/>
+          <a:chOff x="0" y="0"/>
+          <a:chExt cx="0" cy="0"/>
+        </a:xfrm>
+      </p:grpSpPr>
+      <p:sp>
+        <p:nvSpPr>
+          <p:cNvPr id="2" name="Title 1">
+            <a:extLst>
+              <a:ext uri="{FF2B5EF4-FFF2-40B4-BE49-F238E27FC236}">
+                <a16:creationId xmlns:a16="http://schemas.microsoft.com/office/drawing/2014/main" id="{1E4C2A9E-C0F4-4E0F-AFFE-27A0CF3625B5}"/>
+              </a:ext>
+            </a:extLst>
+          </p:cNvPr>
+          <p:cNvSpPr>
+            <a:spLocks noGrp="1"/>
+          </p:cNvSpPr>
+          <p:nvPr>
+            <p:ph type="title"/>
+          </p:nvPr>
+        </p:nvSpPr>
+        <p:spPr/>
+        <p:txBody>
+          <a:bodyPr/>
+          <a:lstStyle/>
+          <a:p>
+            <a:r>
+              <a:rPr lang="en-US"/>
+              <a:t>Week 20 </a:t>
+            </a:r>
+            <a:r>
+              <a:rPr lang="en-US" dirty="0"/>
+              <a:t>Group Exercise</a:t>
+            </a:r>
+          </a:p>
+        </p:txBody>
+      </p:sp>
+      <p:sp>
+        <p:nvSpPr>
+          <p:cNvPr id="3" name="Content Placeholder 2">
+            <a:extLst>
+              <a:ext uri="{FF2B5EF4-FFF2-40B4-BE49-F238E27FC236}">
+                <a16:creationId xmlns:a16="http://schemas.microsoft.com/office/drawing/2014/main" id="{D327E97E-AE1B-400B-A18F-C9C7C854DCEB}"/>
+              </a:ext>
+            </a:extLst>
+          </p:cNvPr>
+          <p:cNvSpPr>
+            <a:spLocks noGrp="1"/>
+          </p:cNvSpPr>
+          <p:nvPr>
+            <p:ph idx="1"/>
+          </p:nvPr>
+        </p:nvSpPr>
+        <p:spPr/>
+        <p:txBody>
+          <a:bodyPr vert="horz" lIns="91440" tIns="45720" rIns="91440" bIns="45720" rtlCol="0" anchor="t">
+            <a:normAutofit/>
+          </a:bodyPr>
+          <a:lstStyle/>
+          <a:p>
+            <a:r>
+              <a:rPr lang="en-US" spc="0" dirty="0"/>
+              <a:t>Once you finish and have submitted your exercise in Canvas via a </a:t>
+            </a:r>
+            <a:r>
+              <a:rPr lang="en-US" spc="0" dirty="0" err="1"/>
+              <a:t>github</a:t>
+            </a:r>
+            <a:r>
+              <a:rPr lang="en-US" spc="0" dirty="0"/>
+              <a:t> link, use the remaining time to work on your homework.</a:t>
+            </a:r>
+          </a:p>
+        </p:txBody>
+      </p:sp>
+    </p:spTree>
+    <p:extLst>
+      <p:ext uri="{BB962C8B-B14F-4D97-AF65-F5344CB8AC3E}">
+        <p14:creationId xmlns:p14="http://schemas.microsoft.com/office/powerpoint/2010/main" val="656484464"/>
+      </p:ext>
+    </p:extLst>
+  </p:cSld>
+  <p:clrMapOvr>
+    <a:masterClrMapping/>
+  </p:clrMapOvr>
+</p:sld>
+</file>
+
 <file path=ppt/slides/slide2.xml><?xml version="1.0" encoding="utf-8"?>
 <p:sld xmlns:a="http://schemas.openxmlformats.org/drawingml/2006/main" xmlns:r="http://schemas.openxmlformats.org/officeDocument/2006/relationships" xmlns:p="http://schemas.openxmlformats.org/presentationml/2006/main">
   <p:cSld>
@@ -6906,10 +7091,10 @@
       </p:grpSpPr>
       <p:sp>
         <p:nvSpPr>
-          <p:cNvPr id="4" name="Title 3">
+          <p:cNvPr id="2" name="Title 1">
             <a:extLst>
               <a:ext uri="{FF2B5EF4-FFF2-40B4-BE49-F238E27FC236}">
-                <a16:creationId xmlns:a16="http://schemas.microsoft.com/office/drawing/2014/main" id="{297BDE90-8DCF-4039-AB05-11C3F09C3813}"/>
+                <a16:creationId xmlns:a16="http://schemas.microsoft.com/office/drawing/2014/main" id="{57C3886C-19E7-46DE-90CE-5230CEE68B43}"/>
               </a:ext>
             </a:extLst>
           </p:cNvPr>
@@ -6917,7 +7102,7 @@
             <a:spLocks noGrp="1"/>
           </p:cNvSpPr>
           <p:nvPr>
-            <p:ph type="ctrTitle"/>
+            <p:ph type="title"/>
           </p:nvPr>
         </p:nvSpPr>
         <p:spPr/>
@@ -6927,17 +7112,17 @@
           <a:p>
             <a:r>
               <a:rPr lang="en-US" dirty="0"/>
-              <a:t>Break (15 Minutes)</a:t>
-            </a:r>
-          </a:p>
-        </p:txBody>
-      </p:sp>
-      <p:sp>
-        <p:nvSpPr>
-          <p:cNvPr id="5" name="Subtitle 4">
+              <a:t>What is localhost?</a:t>
+            </a:r>
+          </a:p>
+        </p:txBody>
+      </p:sp>
+      <p:sp>
+        <p:nvSpPr>
+          <p:cNvPr id="3" name="Content Placeholder 2">
             <a:extLst>
               <a:ext uri="{FF2B5EF4-FFF2-40B4-BE49-F238E27FC236}">
-                <a16:creationId xmlns:a16="http://schemas.microsoft.com/office/drawing/2014/main" id="{AE43AD4D-53BE-4D90-B4EE-A313556AC5A9}"/>
+                <a16:creationId xmlns:a16="http://schemas.microsoft.com/office/drawing/2014/main" id="{65B164B4-EC1A-4997-82F7-E7681854D89F}"/>
               </a:ext>
             </a:extLst>
           </p:cNvPr>
@@ -6945,7 +7130,7 @@
             <a:spLocks noGrp="1"/>
           </p:cNvSpPr>
           <p:nvPr>
-            <p:ph type="subTitle" idx="1"/>
+            <p:ph idx="1"/>
           </p:nvPr>
         </p:nvSpPr>
         <p:spPr/>
@@ -6955,46 +7140,79 @@
           <a:p>
             <a:r>
               <a:rPr lang="en-US" dirty="0"/>
-              <a:t>Attendance </a:t>
-            </a:r>
-            <a:r>
-              <a:rPr lang="en-US" dirty="0" err="1"/>
-              <a:t>word:</a:t>
-            </a:r>
-            <a:r>
-              <a:rPr lang="en-US" b="0" i="0" dirty="0" err="1">
+              <a:t>127.0.0.1 = localhost = home computer</a:t>
+            </a:r>
+          </a:p>
+          <a:p>
+            <a:r>
+              <a:rPr lang="en-US" dirty="0"/>
+              <a:t>No websites can have IP addresses that start with 127, as they are reserved for loopbacks, which let you interact with your own web server</a:t>
+            </a:r>
+          </a:p>
+          <a:p>
+            <a:r>
+              <a:rPr lang="en-US" dirty="0"/>
+              <a:t>We test applications in localhost BECAUSE the computer simulates a webserver when a loopback </a:t>
+            </a:r>
+            <a:r>
+              <a:rPr lang="en-US"/>
+              <a:t>is triggered</a:t>
+            </a:r>
+            <a:endParaRPr lang="en-US" dirty="0"/>
+          </a:p>
+        </p:txBody>
+      </p:sp>
+      <p:pic>
+        <p:nvPicPr>
+          <p:cNvPr id="1026" name="Picture 2" descr="There's No Place Like 127.0.0.1 | Explained | by Hackers League Books |  Medium">
+            <a:extLst>
+              <a:ext uri="{FF2B5EF4-FFF2-40B4-BE49-F238E27FC236}">
+                <a16:creationId xmlns:a16="http://schemas.microsoft.com/office/drawing/2014/main" id="{B7A960B0-8D86-4805-B259-AC183C536807}"/>
+              </a:ext>
+            </a:extLst>
+          </p:cNvPr>
+          <p:cNvPicPr>
+            <a:picLocks noChangeAspect="1" noChangeArrowheads="1"/>
+          </p:cNvPicPr>
+          <p:nvPr/>
+        </p:nvPicPr>
+        <p:blipFill>
+          <a:blip r:embed="rId3">
+            <a:extLst>
+              <a:ext uri="{28A0092B-C50C-407E-A947-70E740481C1C}">
+                <a14:useLocalDpi xmlns:a14="http://schemas.microsoft.com/office/drawing/2010/main" val="0"/>
+              </a:ext>
+            </a:extLst>
+          </a:blip>
+          <a:srcRect/>
+          <a:stretch>
+            <a:fillRect/>
+          </a:stretch>
+        </p:blipFill>
+        <p:spPr bwMode="auto">
+          <a:xfrm>
+            <a:off x="7495629" y="101184"/>
+            <a:ext cx="2867025" cy="1590675"/>
+          </a:xfrm>
+          <a:prstGeom prst="rect">
+            <a:avLst/>
+          </a:prstGeom>
+          <a:noFill/>
+          <a:extLst>
+            <a:ext uri="{909E8E84-426E-40DD-AFC4-6F175D3DCCD1}">
+              <a14:hiddenFill xmlns:a14="http://schemas.microsoft.com/office/drawing/2010/main">
                 <a:solidFill>
-                  <a:schemeClr val="tx1"/>
+                  <a:srgbClr val="FFFFFF"/>
                 </a:solidFill>
-                <a:effectLst/>
-                <a:latin typeface="Slack-Lato"/>
-              </a:rPr>
-              <a:t>CSSConjurer</a:t>
-            </a:r>
-            <a:r>
-              <a:rPr lang="en-US" b="0" i="0" dirty="0">
-                <a:solidFill>
-                  <a:srgbClr val="1D1C1D"/>
-                </a:solidFill>
-                <a:effectLst/>
-                <a:latin typeface="Slack-Lato"/>
-              </a:rPr>
-              <a:t> </a:t>
-            </a:r>
-            <a:endParaRPr lang="en-US" dirty="0">
-              <a:solidFill>
-                <a:schemeClr val="tx1">
-                  <a:lumMod val="95000"/>
-                </a:schemeClr>
-              </a:solidFill>
-            </a:endParaRPr>
-          </a:p>
-        </p:txBody>
-      </p:sp>
+              </a14:hiddenFill>
+            </a:ext>
+          </a:extLst>
+        </p:spPr>
+      </p:pic>
     </p:spTree>
     <p:extLst>
       <p:ext uri="{BB962C8B-B14F-4D97-AF65-F5344CB8AC3E}">
-        <p14:creationId xmlns:p14="http://schemas.microsoft.com/office/powerpoint/2010/main" val="2787214284"/>
+        <p14:creationId xmlns:p14="http://schemas.microsoft.com/office/powerpoint/2010/main" val="3462930339"/>
       </p:ext>
     </p:extLst>
   </p:cSld>
@@ -7023,10 +7241,10 @@
       </p:grpSpPr>
       <p:sp>
         <p:nvSpPr>
-          <p:cNvPr id="2" name="Title 1">
+          <p:cNvPr id="4" name="Title 3">
             <a:extLst>
               <a:ext uri="{FF2B5EF4-FFF2-40B4-BE49-F238E27FC236}">
-                <a16:creationId xmlns:a16="http://schemas.microsoft.com/office/drawing/2014/main" id="{1E4C2A9E-C0F4-4E0F-AFFE-27A0CF3625B5}"/>
+                <a16:creationId xmlns:a16="http://schemas.microsoft.com/office/drawing/2014/main" id="{297BDE90-8DCF-4039-AB05-11C3F09C3813}"/>
               </a:ext>
             </a:extLst>
           </p:cNvPr>
@@ -7034,7 +7252,7 @@
             <a:spLocks noGrp="1"/>
           </p:cNvSpPr>
           <p:nvPr>
-            <p:ph type="title"/>
+            <p:ph type="ctrTitle"/>
           </p:nvPr>
         </p:nvSpPr>
         <p:spPr/>
@@ -7043,22 +7261,18 @@
           <a:lstStyle/>
           <a:p>
             <a:r>
-              <a:rPr lang="en-US"/>
-              <a:t>Week 20 </a:t>
-            </a:r>
-            <a:r>
               <a:rPr lang="en-US" dirty="0"/>
-              <a:t>Group Exercise</a:t>
-            </a:r>
-          </a:p>
-        </p:txBody>
-      </p:sp>
-      <p:sp>
-        <p:nvSpPr>
-          <p:cNvPr id="3" name="Content Placeholder 2">
+              <a:t>Break (15 Minutes)</a:t>
+            </a:r>
+          </a:p>
+        </p:txBody>
+      </p:sp>
+      <p:sp>
+        <p:nvSpPr>
+          <p:cNvPr id="5" name="Subtitle 4">
             <a:extLst>
               <a:ext uri="{FF2B5EF4-FFF2-40B4-BE49-F238E27FC236}">
-                <a16:creationId xmlns:a16="http://schemas.microsoft.com/office/drawing/2014/main" id="{D327E97E-AE1B-400B-A18F-C9C7C854DCEB}"/>
+                <a16:creationId xmlns:a16="http://schemas.microsoft.com/office/drawing/2014/main" id="{AE43AD4D-53BE-4D90-B4EE-A313556AC5A9}"/>
               </a:ext>
             </a:extLst>
           </p:cNvPr>
@@ -7066,35 +7280,56 @@
             <a:spLocks noGrp="1"/>
           </p:cNvSpPr>
           <p:nvPr>
-            <p:ph idx="1"/>
+            <p:ph type="subTitle" idx="1"/>
           </p:nvPr>
         </p:nvSpPr>
         <p:spPr/>
         <p:txBody>
-          <a:bodyPr vert="horz" lIns="91440" tIns="45720" rIns="91440" bIns="45720" rtlCol="0" anchor="t">
-            <a:normAutofit/>
-          </a:bodyPr>
+          <a:bodyPr/>
           <a:lstStyle/>
           <a:p>
             <a:r>
-              <a:rPr lang="en-US" spc="0" dirty="0"/>
-              <a:t>Once you finish and have submitted your exercise in Canvas via a </a:t>
-            </a:r>
-            <a:r>
-              <a:rPr lang="en-US" spc="0" dirty="0" err="1"/>
-              <a:t>github</a:t>
-            </a:r>
-            <a:r>
-              <a:rPr lang="en-US" spc="0" dirty="0"/>
-              <a:t> link, use the remaining time to work on your homework.</a:t>
-            </a:r>
+              <a:rPr lang="en-US" dirty="0"/>
+              <a:t>Attendance </a:t>
+            </a:r>
+            <a:r>
+              <a:rPr lang="en-US" dirty="0" err="1"/>
+              <a:t>word:</a:t>
+            </a:r>
+            <a:r>
+              <a:rPr lang="en-US" b="0" i="0" dirty="0" err="1">
+                <a:solidFill>
+                  <a:schemeClr val="tx1"/>
+                </a:solidFill>
+                <a:effectLst/>
+                <a:latin typeface="Slack-Lato"/>
+              </a:rPr>
+              <a:t>CSSConjurer</a:t>
+            </a:r>
+            <a:r>
+              <a:rPr lang="en-US" b="0" i="0" dirty="0">
+                <a:solidFill>
+                  <a:srgbClr val="1D1C1D"/>
+                </a:solidFill>
+                <a:effectLst/>
+                <a:latin typeface="Slack-Lato"/>
+              </a:rPr>
+              <a:t> </a:t>
+            </a:r>
+            <a:endParaRPr lang="en-US" dirty="0">
+              <a:solidFill>
+                <a:schemeClr val="tx1">
+                  <a:lumMod val="95000"/>
+                </a:schemeClr>
+              </a:solidFill>
+            </a:endParaRPr>
           </a:p>
         </p:txBody>
       </p:sp>
     </p:spTree>
     <p:extLst>
       <p:ext uri="{BB962C8B-B14F-4D97-AF65-F5344CB8AC3E}">
-        <p14:creationId xmlns:p14="http://schemas.microsoft.com/office/powerpoint/2010/main" val="656484464"/>
+        <p14:creationId xmlns:p14="http://schemas.microsoft.com/office/powerpoint/2010/main" val="2787214284"/>
       </p:ext>
     </p:extLst>
   </p:cSld>

</xml_diff>